<commit_message>
fixed total number of sightings
</commit_message>
<xml_diff>
--- a/Craft_a_Story.pptx
+++ b/Craft_a_Story.pptx
@@ -112,6 +112,11 @@
       </a:defRPr>
     </a:lvl9pPr>
   </p:defaultTextStyle>
+  <p:extLst>
+    <p:ext uri="{EFAFB233-063F-42B5-8137-9DF3F51BA10A}">
+      <p15:sldGuideLst xmlns:p15="http://schemas.microsoft.com/office/powerpoint/2012/main"/>
+    </p:ext>
+  </p:extLst>
 </p:presentation>
 </file>
 
@@ -262,7 +267,7 @@
           <a:p>
             <a:fld id="{254D03AD-C6DE-3740-BFDE-664B5CA768BE}" type="datetimeFigureOut">
               <a:rPr lang="en-US" smtClean="0"/>
-              <a:t>6/13/23</a:t>
+              <a:t>6/19/23</a:t>
             </a:fld>
             <a:endParaRPr lang="en-US"/>
           </a:p>
@@ -460,7 +465,7 @@
           <a:p>
             <a:fld id="{254D03AD-C6DE-3740-BFDE-664B5CA768BE}" type="datetimeFigureOut">
               <a:rPr lang="en-US" smtClean="0"/>
-              <a:t>6/13/23</a:t>
+              <a:t>6/19/23</a:t>
             </a:fld>
             <a:endParaRPr lang="en-US"/>
           </a:p>
@@ -668,7 +673,7 @@
           <a:p>
             <a:fld id="{254D03AD-C6DE-3740-BFDE-664B5CA768BE}" type="datetimeFigureOut">
               <a:rPr lang="en-US" smtClean="0"/>
-              <a:t>6/13/23</a:t>
+              <a:t>6/19/23</a:t>
             </a:fld>
             <a:endParaRPr lang="en-US"/>
           </a:p>
@@ -866,7 +871,7 @@
           <a:p>
             <a:fld id="{254D03AD-C6DE-3740-BFDE-664B5CA768BE}" type="datetimeFigureOut">
               <a:rPr lang="en-US" smtClean="0"/>
-              <a:t>6/13/23</a:t>
+              <a:t>6/19/23</a:t>
             </a:fld>
             <a:endParaRPr lang="en-US"/>
           </a:p>
@@ -1141,7 +1146,7 @@
           <a:p>
             <a:fld id="{254D03AD-C6DE-3740-BFDE-664B5CA768BE}" type="datetimeFigureOut">
               <a:rPr lang="en-US" smtClean="0"/>
-              <a:t>6/13/23</a:t>
+              <a:t>6/19/23</a:t>
             </a:fld>
             <a:endParaRPr lang="en-US"/>
           </a:p>
@@ -1406,7 +1411,7 @@
           <a:p>
             <a:fld id="{254D03AD-C6DE-3740-BFDE-664B5CA768BE}" type="datetimeFigureOut">
               <a:rPr lang="en-US" smtClean="0"/>
-              <a:t>6/13/23</a:t>
+              <a:t>6/19/23</a:t>
             </a:fld>
             <a:endParaRPr lang="en-US"/>
           </a:p>
@@ -1818,7 +1823,7 @@
           <a:p>
             <a:fld id="{254D03AD-C6DE-3740-BFDE-664B5CA768BE}" type="datetimeFigureOut">
               <a:rPr lang="en-US" smtClean="0"/>
-              <a:t>6/13/23</a:t>
+              <a:t>6/19/23</a:t>
             </a:fld>
             <a:endParaRPr lang="en-US"/>
           </a:p>
@@ -1959,7 +1964,7 @@
           <a:p>
             <a:fld id="{254D03AD-C6DE-3740-BFDE-664B5CA768BE}" type="datetimeFigureOut">
               <a:rPr lang="en-US" smtClean="0"/>
-              <a:t>6/13/23</a:t>
+              <a:t>6/19/23</a:t>
             </a:fld>
             <a:endParaRPr lang="en-US"/>
           </a:p>
@@ -2072,7 +2077,7 @@
           <a:p>
             <a:fld id="{254D03AD-C6DE-3740-BFDE-664B5CA768BE}" type="datetimeFigureOut">
               <a:rPr lang="en-US" smtClean="0"/>
-              <a:t>6/13/23</a:t>
+              <a:t>6/19/23</a:t>
             </a:fld>
             <a:endParaRPr lang="en-US"/>
           </a:p>
@@ -2383,7 +2388,7 @@
           <a:p>
             <a:fld id="{254D03AD-C6DE-3740-BFDE-664B5CA768BE}" type="datetimeFigureOut">
               <a:rPr lang="en-US" smtClean="0"/>
-              <a:t>6/13/23</a:t>
+              <a:t>6/19/23</a:t>
             </a:fld>
             <a:endParaRPr lang="en-US"/>
           </a:p>
@@ -2671,7 +2676,7 @@
           <a:p>
             <a:fld id="{254D03AD-C6DE-3740-BFDE-664B5CA768BE}" type="datetimeFigureOut">
               <a:rPr lang="en-US" smtClean="0"/>
-              <a:t>6/13/23</a:t>
+              <a:t>6/19/23</a:t>
             </a:fld>
             <a:endParaRPr lang="en-US"/>
           </a:p>
@@ -2915,7 +2920,7 @@
           <a:p>
             <a:fld id="{254D03AD-C6DE-3740-BFDE-664B5CA768BE}" type="datetimeFigureOut">
               <a:rPr lang="en-US" smtClean="0"/>
-              <a:t>6/13/23</a:t>
+              <a:t>6/19/23</a:t>
             </a:fld>
             <a:endParaRPr lang="en-US"/>
           </a:p>
@@ -3543,21 +3548,44 @@
           </a:p>
         </p:txBody>
       </p:sp>
+      <p:sp>
+        <p:nvSpPr>
+          <p:cNvPr id="4" name="Content Placeholder 3">
+            <a:extLst>
+              <a:ext uri="{FF2B5EF4-FFF2-40B4-BE49-F238E27FC236}">
+                <a16:creationId xmlns:a16="http://schemas.microsoft.com/office/drawing/2014/main" id="{F5F74357-9FAA-ED74-98AE-89DE77D72A0F}"/>
+              </a:ext>
+            </a:extLst>
+          </p:cNvPr>
+          <p:cNvSpPr>
+            <a:spLocks noGrp="1"/>
+          </p:cNvSpPr>
+          <p:nvPr>
+            <p:ph idx="1"/>
+          </p:nvPr>
+        </p:nvSpPr>
+        <p:spPr/>
+        <p:txBody>
+          <a:bodyPr/>
+          <a:lstStyle/>
+          <a:p>
+            <a:endParaRPr lang="en-US"/>
+          </a:p>
+        </p:txBody>
+      </p:sp>
       <p:pic>
         <p:nvPicPr>
-          <p:cNvPr id="10" name="Content Placeholder 9">
-            <a:extLst>
-              <a:ext uri="{FF2B5EF4-FFF2-40B4-BE49-F238E27FC236}">
-                <a16:creationId xmlns:a16="http://schemas.microsoft.com/office/drawing/2014/main" id="{9116415E-EF53-F4F5-6E78-FFDF361F50C8}"/>
+          <p:cNvPr id="7" name="Picture 6">
+            <a:extLst>
+              <a:ext uri="{FF2B5EF4-FFF2-40B4-BE49-F238E27FC236}">
+                <a16:creationId xmlns:a16="http://schemas.microsoft.com/office/drawing/2014/main" id="{B79FE878-8A16-112A-0505-6C1802E37508}"/>
               </a:ext>
             </a:extLst>
           </p:cNvPr>
           <p:cNvPicPr>
-            <a:picLocks noGrp="1" noChangeAspect="1"/>
+            <a:picLocks noChangeAspect="1"/>
           </p:cNvPicPr>
-          <p:nvPr>
-            <p:ph idx="1"/>
-          </p:nvPr>
+          <p:nvPr/>
         </p:nvPicPr>
         <p:blipFill>
           <a:blip r:embed="rId2"/>
@@ -3567,8 +3595,8 @@
         </p:blipFill>
         <p:spPr>
           <a:xfrm>
-            <a:off x="2036618" y="139022"/>
-            <a:ext cx="8118764" cy="6718978"/>
+            <a:off x="1956955" y="0"/>
+            <a:ext cx="8278091" cy="6850834"/>
           </a:xfrm>
           <a:prstGeom prst="rect">
             <a:avLst/>

</xml_diff>